<commit_message>
oop: tweak LOs for abstract classes and interfaces
</commit_message>
<xml_diff>
--- a/diagrams/uml/classDiagrams/interfaceInheritance/staff.pptx
+++ b/diagrams/uml/classDiagrams/interfaceInheritance/staff.pptx
@@ -104,6 +104,22 @@
       </a:defRPr>
     </a:lvl9pPr>
   </p:defaultTextStyle>
+  <p:extLst>
+    <p:ext uri="{EFAFB233-063F-42B5-8137-9DF3F51BA10A}">
+      <p15:sldGuideLst xmlns:p15="http://schemas.microsoft.com/office/powerpoint/2012/main">
+        <p15:guide id="1" orient="horz" pos="2160">
+          <p15:clr>
+            <a:srgbClr val="A4A3A4"/>
+          </p15:clr>
+        </p15:guide>
+        <p15:guide id="2" pos="2880">
+          <p15:clr>
+            <a:srgbClr val="A4A3A4"/>
+          </p15:clr>
+        </p15:guide>
+      </p15:sldGuideLst>
+    </p:ext>
+  </p:extLst>
 </p:presentation>
 </file>
 
@@ -288,7 +304,7 @@
           <a:p>
             <a:fld id="{A0F86979-30DA-49EE-A740-32EBA6D2B7DE}" type="datetimeFigureOut">
               <a:rPr lang="en-SG" smtClean="0"/>
-              <a:t>2/6/2017</a:t>
+              <a:t>11/9/2017</a:t>
             </a:fld>
             <a:endParaRPr lang="en-SG"/>
           </a:p>
@@ -458,7 +474,7 @@
           <a:p>
             <a:fld id="{A0F86979-30DA-49EE-A740-32EBA6D2B7DE}" type="datetimeFigureOut">
               <a:rPr lang="en-SG" smtClean="0"/>
-              <a:t>2/6/2017</a:t>
+              <a:t>11/9/2017</a:t>
             </a:fld>
             <a:endParaRPr lang="en-SG"/>
           </a:p>
@@ -638,7 +654,7 @@
           <a:p>
             <a:fld id="{A0F86979-30DA-49EE-A740-32EBA6D2B7DE}" type="datetimeFigureOut">
               <a:rPr lang="en-SG" smtClean="0"/>
-              <a:t>2/6/2017</a:t>
+              <a:t>11/9/2017</a:t>
             </a:fld>
             <a:endParaRPr lang="en-SG"/>
           </a:p>
@@ -808,7 +824,7 @@
           <a:p>
             <a:fld id="{A0F86979-30DA-49EE-A740-32EBA6D2B7DE}" type="datetimeFigureOut">
               <a:rPr lang="en-SG" smtClean="0"/>
-              <a:t>2/6/2017</a:t>
+              <a:t>11/9/2017</a:t>
             </a:fld>
             <a:endParaRPr lang="en-SG"/>
           </a:p>
@@ -1054,7 +1070,7 @@
           <a:p>
             <a:fld id="{A0F86979-30DA-49EE-A740-32EBA6D2B7DE}" type="datetimeFigureOut">
               <a:rPr lang="en-SG" smtClean="0"/>
-              <a:t>2/6/2017</a:t>
+              <a:t>11/9/2017</a:t>
             </a:fld>
             <a:endParaRPr lang="en-SG"/>
           </a:p>
@@ -1342,7 +1358,7 @@
           <a:p>
             <a:fld id="{A0F86979-30DA-49EE-A740-32EBA6D2B7DE}" type="datetimeFigureOut">
               <a:rPr lang="en-SG" smtClean="0"/>
-              <a:t>2/6/2017</a:t>
+              <a:t>11/9/2017</a:t>
             </a:fld>
             <a:endParaRPr lang="en-SG"/>
           </a:p>
@@ -1764,7 +1780,7 @@
           <a:p>
             <a:fld id="{A0F86979-30DA-49EE-A740-32EBA6D2B7DE}" type="datetimeFigureOut">
               <a:rPr lang="en-SG" smtClean="0"/>
-              <a:t>2/6/2017</a:t>
+              <a:t>11/9/2017</a:t>
             </a:fld>
             <a:endParaRPr lang="en-SG"/>
           </a:p>
@@ -1882,7 +1898,7 @@
           <a:p>
             <a:fld id="{A0F86979-30DA-49EE-A740-32EBA6D2B7DE}" type="datetimeFigureOut">
               <a:rPr lang="en-SG" smtClean="0"/>
-              <a:t>2/6/2017</a:t>
+              <a:t>11/9/2017</a:t>
             </a:fld>
             <a:endParaRPr lang="en-SG"/>
           </a:p>
@@ -1977,7 +1993,7 @@
           <a:p>
             <a:fld id="{A0F86979-30DA-49EE-A740-32EBA6D2B7DE}" type="datetimeFigureOut">
               <a:rPr lang="en-SG" smtClean="0"/>
-              <a:t>2/6/2017</a:t>
+              <a:t>11/9/2017</a:t>
             </a:fld>
             <a:endParaRPr lang="en-SG"/>
           </a:p>
@@ -2254,7 +2270,7 @@
           <a:p>
             <a:fld id="{A0F86979-30DA-49EE-A740-32EBA6D2B7DE}" type="datetimeFigureOut">
               <a:rPr lang="en-SG" smtClean="0"/>
-              <a:t>2/6/2017</a:t>
+              <a:t>11/9/2017</a:t>
             </a:fld>
             <a:endParaRPr lang="en-SG"/>
           </a:p>
@@ -2507,7 +2523,7 @@
           <a:p>
             <a:fld id="{A0F86979-30DA-49EE-A740-32EBA6D2B7DE}" type="datetimeFigureOut">
               <a:rPr lang="en-SG" smtClean="0"/>
-              <a:t>2/6/2017</a:t>
+              <a:t>11/9/2017</a:t>
             </a:fld>
             <a:endParaRPr lang="en-SG"/>
           </a:p>
@@ -2720,7 +2736,7 @@
           <a:p>
             <a:fld id="{A0F86979-30DA-49EE-A740-32EBA6D2B7DE}" type="datetimeFigureOut">
               <a:rPr lang="en-SG" smtClean="0"/>
-              <a:t>2/6/2017</a:t>
+              <a:t>11/9/2017</a:t>
             </a:fld>
             <a:endParaRPr lang="en-SG"/>
           </a:p>
@@ -3165,9 +3181,9 @@
               <a:gd name="adj1" fmla="val 50000"/>
             </a:avLst>
           </a:prstGeom>
-          <a:ln w="19050">
+          <a:ln w="28575">
             <a:solidFill>
-              <a:schemeClr val="tx1"/>
+              <a:srgbClr val="FF0000"/>
             </a:solidFill>
             <a:prstDash val="dash"/>
             <a:headEnd type="none" w="med" len="med"/>
@@ -3206,9 +3222,9 @@
           <a:solidFill>
             <a:schemeClr val="bg1"/>
           </a:solidFill>
-          <a:ln w="12700">
+          <a:ln w="28575">
             <a:solidFill>
-              <a:schemeClr val="tx1"/>
+              <a:srgbClr val="FF0000"/>
             </a:solidFill>
           </a:ln>
         </p:spPr>
@@ -3307,9 +3323,9 @@
               <a:gd name="adj1" fmla="val 50000"/>
             </a:avLst>
           </a:prstGeom>
-          <a:ln w="19050">
+          <a:ln w="28575">
             <a:solidFill>
-              <a:schemeClr val="tx1"/>
+              <a:srgbClr val="FF0000"/>
             </a:solidFill>
             <a:prstDash val="dash"/>
             <a:headEnd type="none" w="med" len="med"/>
@@ -4082,120 +4098,6 @@
               </a:rPr>
               <a:t>()</a:t>
             </a:r>
-          </a:p>
-        </p:txBody>
-      </p:sp>
-      <p:sp>
-        <p:nvSpPr>
-          <p:cNvPr id="288" name="AutoShape 19"/>
-          <p:cNvSpPr>
-            <a:spLocks/>
-          </p:cNvSpPr>
-          <p:nvPr/>
-        </p:nvSpPr>
-        <p:spPr bwMode="auto">
-          <a:xfrm>
-            <a:off x="390377" y="2571124"/>
-            <a:ext cx="2934268" cy="1011456"/>
-          </a:xfrm>
-          <a:prstGeom prst="wedgeRectCallout">
-            <a:avLst>
-              <a:gd name="adj1" fmla="val 107367"/>
-              <a:gd name="adj2" fmla="val 29750"/>
-            </a:avLst>
-          </a:prstGeom>
-          <a:solidFill>
-            <a:schemeClr val="accent1">
-              <a:lumMod val="20000"/>
-              <a:lumOff val="80000"/>
-            </a:schemeClr>
-          </a:solidFill>
-          <a:ln w="9525">
-            <a:solidFill>
-              <a:srgbClr val="7030A0"/>
-            </a:solidFill>
-            <a:prstDash val="sysDash"/>
-            <a:headEnd type="none" w="med" len="med"/>
-            <a:tailEnd type="arrow" w="med" len="med"/>
-          </a:ln>
-        </p:spPr>
-        <p:style>
-          <a:lnRef idx="2">
-            <a:schemeClr val="accent1">
-              <a:shade val="50000"/>
-            </a:schemeClr>
-          </a:lnRef>
-          <a:fillRef idx="1">
-            <a:schemeClr val="accent1"/>
-          </a:fillRef>
-          <a:effectRef idx="0">
-            <a:schemeClr val="accent1"/>
-          </a:effectRef>
-          <a:fontRef idx="minor">
-            <a:schemeClr val="lt1"/>
-          </a:fontRef>
-        </p:style>
-        <p:txBody>
-          <a:bodyPr wrap="square" lIns="87273" tIns="43637" rIns="87273" bIns="43637" rtlCol="0" anchor="ctr">
-            <a:spAutoFit/>
-          </a:bodyPr>
-          <a:lstStyle/>
-          <a:p>
-            <a:pPr algn="ctr">
-              <a:spcBef>
-                <a:spcPct val="20000"/>
-              </a:spcBef>
-              <a:buClr>
-                <a:srgbClr val="FFFFFF"/>
-              </a:buClr>
-              <a:buSzPct val="100000"/>
-              <a:defRPr/>
-            </a:pPr>
-            <a:r>
-              <a:rPr lang="en-US" sz="2000" dirty="0" smtClean="0">
-                <a:solidFill>
-                  <a:srgbClr val="7030A0"/>
-                </a:solidFill>
-              </a:rPr>
-              <a:t>This means </a:t>
-            </a:r>
-            <a:r>
-              <a:rPr lang="en-US" sz="2000" dirty="0" smtClean="0">
-                <a:solidFill>
-                  <a:srgbClr val="C00000"/>
-                </a:solidFill>
-              </a:rPr>
-              <a:t>Admin</a:t>
-            </a:r>
-            <a:r>
-              <a:rPr lang="en-US" sz="2000" dirty="0" smtClean="0">
-                <a:solidFill>
-                  <a:srgbClr val="7030A0"/>
-                </a:solidFill>
-              </a:rPr>
-              <a:t> “implements” the </a:t>
-            </a:r>
-            <a:r>
-              <a:rPr lang="en-US" sz="2000" dirty="0" err="1" smtClean="0">
-                <a:solidFill>
-                  <a:srgbClr val="C00000"/>
-                </a:solidFill>
-              </a:rPr>
-              <a:t>SalariedStaff</a:t>
-            </a:r>
-            <a:r>
-              <a:rPr lang="en-US" sz="2000" dirty="0" smtClean="0">
-                <a:solidFill>
-                  <a:srgbClr val="7030A0"/>
-                </a:solidFill>
-              </a:rPr>
-              <a:t> interface</a:t>
-            </a:r>
-            <a:endParaRPr lang="en-US" sz="2000" dirty="0">
-              <a:solidFill>
-                <a:srgbClr val="7030A0"/>
-              </a:solidFill>
-            </a:endParaRPr>
           </a:p>
         </p:txBody>
       </p:sp>
@@ -4310,33 +4212,6 @@
                                   </p:childTnLst>
                                 </p:cTn>
                               </p:par>
-                              <p:par>
-                                <p:cTn id="11" presetID="1" presetClass="entr" presetSubtype="0" fill="hold" grpId="0" nodeType="withEffect">
-                                  <p:stCondLst>
-                                    <p:cond delay="0"/>
-                                  </p:stCondLst>
-                                  <p:childTnLst>
-                                    <p:set>
-                                      <p:cBhvr>
-                                        <p:cTn id="12" dur="1" fill="hold">
-                                          <p:stCondLst>
-                                            <p:cond delay="0"/>
-                                          </p:stCondLst>
-                                        </p:cTn>
-                                        <p:tgtEl>
-                                          <p:spTgt spid="288"/>
-                                        </p:tgtEl>
-                                        <p:attrNameLst>
-                                          <p:attrName>style.visibility</p:attrName>
-                                        </p:attrNameLst>
-                                      </p:cBhvr>
-                                      <p:to>
-                                        <p:strVal val="visible"/>
-                                      </p:to>
-                                    </p:set>
-                                  </p:childTnLst>
-                                </p:cTn>
-                              </p:par>
                             </p:childTnLst>
                           </p:cTn>
                         </p:par>
@@ -4366,7 +4241,6 @@
     </p:tnLst>
     <p:bldLst>
       <p:bldP spid="278" grpId="0" animBg="1"/>
-      <p:bldP spid="288" grpId="0" animBg="1"/>
     </p:bldLst>
   </p:timing>
 </p:sld>

</xml_diff>